<commit_message>
modification in first slide
</commit_message>
<xml_diff>
--- a/Reference/ONLINE BLOOD DONATION(OBD).pptx
+++ b/Reference/ONLINE BLOOD DONATION(OBD).pptx
@@ -3625,42 +3625,42 @@
         </p:nvSpPr>
         <p:spPr>
           <a:xfrm>
-            <a:off x="4034401" y="2700585"/>
-            <a:ext cx="4483099" cy="1302537"/>
+            <a:off x="0" y="2700585"/>
+            <a:ext cx="12192000" cy="1302537"/>
           </a:xfrm>
         </p:spPr>
         <p:txBody>
           <a:bodyPr>
-            <a:normAutofit/>
+            <a:noAutofit/>
           </a:bodyPr>
           <a:lstStyle/>
           <a:p>
             <a:r>
-              <a:rPr lang="en-US" sz="2000" dirty="0" smtClean="0"/>
+              <a:rPr lang="en-US" dirty="0" smtClean="0"/>
               <a:t>A Proposal on</a:t>
             </a:r>
             <a:r>
-              <a:rPr lang="en-US" sz="2000" b="1" dirty="0" smtClean="0"/>
+              <a:rPr lang="en-US" b="1" dirty="0" smtClean="0"/>
               <a:t> </a:t>
             </a:r>
-            <a:endParaRPr lang="en-US" sz="2000" dirty="0" smtClean="0"/>
-          </a:p>
-          <a:p>
-            <a:r>
-              <a:rPr lang="en-US" sz="2000" b="1" dirty="0" smtClean="0"/>
+            <a:endParaRPr lang="en-US" dirty="0" smtClean="0"/>
+          </a:p>
+          <a:p>
+            <a:r>
+              <a:rPr lang="en-US" b="1" dirty="0" smtClean="0"/>
               <a:t>ONLINE BLOOD DONATION</a:t>
             </a:r>
           </a:p>
           <a:p>
             <a:r>
-              <a:rPr lang="en-US" sz="2000" b="1" dirty="0" smtClean="0"/>
+              <a:rPr lang="en-US" b="1" dirty="0" smtClean="0"/>
               <a:t>(OBD)</a:t>
             </a:r>
-            <a:endParaRPr lang="en-US" sz="2000" dirty="0" smtClean="0"/>
+            <a:endParaRPr lang="en-US" dirty="0" smtClean="0"/>
           </a:p>
           <a:p>
             <a:pPr algn="l"/>
-            <a:endParaRPr lang="en-US" sz="2000" b="1" i="1" dirty="0">
+            <a:endParaRPr lang="en-US" b="1" i="1" dirty="0">
               <a:solidFill>
                 <a:schemeClr val="tx1">
                   <a:lumMod val="50000"/>
@@ -3685,8 +3685,8 @@
         </p:nvSpPr>
         <p:spPr>
           <a:xfrm>
-            <a:off x="677049" y="492525"/>
-            <a:ext cx="11193864" cy="1828800"/>
+            <a:off x="0" y="582677"/>
+            <a:ext cx="12192000" cy="1828800"/>
           </a:xfrm>
         </p:spPr>
         <p:txBody>
@@ -3696,20 +3696,20 @@
           <a:lstStyle/>
           <a:p>
             <a:r>
-              <a:rPr lang="en-US" sz="1800" dirty="0">
+              <a:rPr lang="en-US" sz="4400" dirty="0">
                 <a:effectLst/>
                 <a:hlinkClick r:id="rId3"/>
               </a:rPr>
               <a:t>Tulips Technologies</a:t>
             </a:r>
             <a:r>
-              <a:rPr lang="en-US" sz="1800" b="0" dirty="0">
+              <a:rPr lang="en-US" sz="4400" b="0" dirty="0">
                 <a:effectLst/>
               </a:rPr>
               <a:t/>
             </a:r>
             <a:br>
-              <a:rPr lang="en-US" sz="1800" b="0" dirty="0">
+              <a:rPr lang="en-US" sz="4400" b="0" dirty="0">
                 <a:effectLst/>
               </a:rPr>
             </a:br>
@@ -3756,8 +3756,8 @@
         </p:nvSpPr>
         <p:spPr>
           <a:xfrm>
-            <a:off x="8515530" y="4820193"/>
-            <a:ext cx="3502297" cy="2123658"/>
+            <a:off x="9028090" y="4820193"/>
+            <a:ext cx="3163910" cy="2123658"/>
           </a:xfrm>
           <a:prstGeom prst="rect">
             <a:avLst/>
@@ -3770,7 +3770,6 @@
           </a:bodyPr>
           <a:lstStyle/>
           <a:p>
-            <a:pPr algn="ctr"/>
             <a:r>
               <a:rPr lang="en-US" sz="2400" b="1" dirty="0" smtClean="0">
                 <a:solidFill>
@@ -3793,7 +3792,7 @@
             </a:r>
           </a:p>
           <a:p>
-            <a:pPr marL="285750" indent="-285750" algn="just">
+            <a:pPr marL="285750" indent="-285750">
               <a:buFont typeface="Arial" panose="020B0604020202020204" pitchFamily="34" charset="0"/>
               <a:buChar char="•"/>
             </a:pPr>
@@ -3815,7 +3814,7 @@
             </a:r>
           </a:p>
           <a:p>
-            <a:pPr marL="285750" indent="-285750" algn="just">
+            <a:pPr marL="285750" indent="-285750">
               <a:buFont typeface="Arial" panose="020B0604020202020204" pitchFamily="34" charset="0"/>
               <a:buChar char="•"/>
             </a:pPr>
@@ -3850,7 +3849,7 @@
             </a:endParaRPr>
           </a:p>
           <a:p>
-            <a:pPr marL="285750" indent="-285750" algn="just">
+            <a:pPr marL="285750" indent="-285750">
               <a:buFont typeface="Arial" panose="020B0604020202020204" pitchFamily="34" charset="0"/>
               <a:buChar char="•"/>
             </a:pPr>
@@ -3877,7 +3876,7 @@
             </a:endParaRPr>
           </a:p>
           <a:p>
-            <a:pPr marL="285750" indent="-285750" algn="just">
+            <a:pPr marL="285750" indent="-285750">
               <a:buFont typeface="Arial" panose="020B0604020202020204" pitchFamily="34" charset="0"/>
               <a:buChar char="•"/>
             </a:pPr>
@@ -3912,7 +3911,7 @@
             </a:endParaRPr>
           </a:p>
           <a:p>
-            <a:pPr marL="285750" indent="-285750" algn="just">
+            <a:pPr marL="285750" indent="-285750">
               <a:buFont typeface="Arial" panose="020B0604020202020204" pitchFamily="34" charset="0"/>
               <a:buChar char="•"/>
             </a:pPr>

</xml_diff>